<commit_message>
add one more page
</commit_message>
<xml_diff>
--- a/맨땅에 옵티마이져.pptx
+++ b/맨땅에 옵티마이져.pptx
@@ -20,12 +20,13 @@
     <p:sldId id="354" r:id="rId14"/>
     <p:sldId id="398" r:id="rId15"/>
     <p:sldId id="399" r:id="rId16"/>
-    <p:sldId id="334" r:id="rId17"/>
-    <p:sldId id="359" r:id="rId18"/>
-    <p:sldId id="380" r:id="rId19"/>
-    <p:sldId id="387" r:id="rId20"/>
-    <p:sldId id="395" r:id="rId21"/>
-    <p:sldId id="307" r:id="rId22"/>
+    <p:sldId id="400" r:id="rId17"/>
+    <p:sldId id="334" r:id="rId18"/>
+    <p:sldId id="359" r:id="rId19"/>
+    <p:sldId id="380" r:id="rId20"/>
+    <p:sldId id="387" r:id="rId21"/>
+    <p:sldId id="395" r:id="rId22"/>
+    <p:sldId id="307" r:id="rId23"/>
   </p:sldIdLst>
   <p:sldSz cx="12192000" cy="6858000"/>
   <p:notesSz cx="6858000" cy="9144000"/>
@@ -261,7 +262,7 @@
           <a:p>
             <a:fld id="{5B3AD1D6-AE87-C841-B3FD-7C9F7FCAE5AE}" type="datetimeFigureOut">
               <a:rPr lang="en-US" smtClean="0"/>
-              <a:t>1/19/20</a:t>
+              <a:t>1/20/20</a:t>
             </a:fld>
             <a:endParaRPr lang="en-US"/>
           </a:p>
@@ -429,7 +430,7 @@
           <a:p>
             <a:fld id="{5B3AD1D6-AE87-C841-B3FD-7C9F7FCAE5AE}" type="datetimeFigureOut">
               <a:rPr lang="en-US" smtClean="0"/>
-              <a:t>1/19/20</a:t>
+              <a:t>1/20/20</a:t>
             </a:fld>
             <a:endParaRPr lang="en-US"/>
           </a:p>
@@ -607,7 +608,7 @@
           <a:p>
             <a:fld id="{5B3AD1D6-AE87-C841-B3FD-7C9F7FCAE5AE}" type="datetimeFigureOut">
               <a:rPr lang="en-US" smtClean="0"/>
-              <a:t>1/19/20</a:t>
+              <a:t>1/20/20</a:t>
             </a:fld>
             <a:endParaRPr lang="en-US"/>
           </a:p>
@@ -775,7 +776,7 @@
           <a:p>
             <a:fld id="{5B3AD1D6-AE87-C841-B3FD-7C9F7FCAE5AE}" type="datetimeFigureOut">
               <a:rPr lang="en-US" smtClean="0"/>
-              <a:t>1/19/20</a:t>
+              <a:t>1/20/20</a:t>
             </a:fld>
             <a:endParaRPr lang="en-US"/>
           </a:p>
@@ -1020,7 +1021,7 @@
           <a:p>
             <a:fld id="{5B3AD1D6-AE87-C841-B3FD-7C9F7FCAE5AE}" type="datetimeFigureOut">
               <a:rPr lang="en-US" smtClean="0"/>
-              <a:t>1/19/20</a:t>
+              <a:t>1/20/20</a:t>
             </a:fld>
             <a:endParaRPr lang="en-US"/>
           </a:p>
@@ -1249,7 +1250,7 @@
           <a:p>
             <a:fld id="{5B3AD1D6-AE87-C841-B3FD-7C9F7FCAE5AE}" type="datetimeFigureOut">
               <a:rPr lang="en-US" smtClean="0"/>
-              <a:t>1/19/20</a:t>
+              <a:t>1/20/20</a:t>
             </a:fld>
             <a:endParaRPr lang="en-US"/>
           </a:p>
@@ -1613,7 +1614,7 @@
           <a:p>
             <a:fld id="{5B3AD1D6-AE87-C841-B3FD-7C9F7FCAE5AE}" type="datetimeFigureOut">
               <a:rPr lang="en-US" smtClean="0"/>
-              <a:t>1/19/20</a:t>
+              <a:t>1/20/20</a:t>
             </a:fld>
             <a:endParaRPr lang="en-US"/>
           </a:p>
@@ -1730,7 +1731,7 @@
           <a:p>
             <a:fld id="{5B3AD1D6-AE87-C841-B3FD-7C9F7FCAE5AE}" type="datetimeFigureOut">
               <a:rPr lang="en-US" smtClean="0"/>
-              <a:t>1/19/20</a:t>
+              <a:t>1/20/20</a:t>
             </a:fld>
             <a:endParaRPr lang="en-US"/>
           </a:p>
@@ -1825,7 +1826,7 @@
           <a:p>
             <a:fld id="{5B3AD1D6-AE87-C841-B3FD-7C9F7FCAE5AE}" type="datetimeFigureOut">
               <a:rPr lang="en-US" smtClean="0"/>
-              <a:t>1/19/20</a:t>
+              <a:t>1/20/20</a:t>
             </a:fld>
             <a:endParaRPr lang="en-US"/>
           </a:p>
@@ -2100,7 +2101,7 @@
           <a:p>
             <a:fld id="{5B3AD1D6-AE87-C841-B3FD-7C9F7FCAE5AE}" type="datetimeFigureOut">
               <a:rPr lang="en-US" smtClean="0"/>
-              <a:t>1/19/20</a:t>
+              <a:t>1/20/20</a:t>
             </a:fld>
             <a:endParaRPr lang="en-US"/>
           </a:p>
@@ -2352,7 +2353,7 @@
           <a:p>
             <a:fld id="{5B3AD1D6-AE87-C841-B3FD-7C9F7FCAE5AE}" type="datetimeFigureOut">
               <a:rPr lang="en-US" smtClean="0"/>
-              <a:t>1/19/20</a:t>
+              <a:t>1/20/20</a:t>
             </a:fld>
             <a:endParaRPr lang="en-US"/>
           </a:p>
@@ -2563,7 +2564,7 @@
           <a:p>
             <a:fld id="{5B3AD1D6-AE87-C841-B3FD-7C9F7FCAE5AE}" type="datetimeFigureOut">
               <a:rPr lang="en-US" smtClean="0"/>
-              <a:t>1/19/20</a:t>
+              <a:t>1/20/20</a:t>
             </a:fld>
             <a:endParaRPr lang="en-US"/>
           </a:p>
@@ -4012,6 +4013,111 @@
       </p:grpSpPr>
       <p:sp>
         <p:nvSpPr>
+          <p:cNvPr id="2" name="TextBox 1"/>
+          <p:cNvSpPr txBox="1"/>
+          <p:nvPr/>
+        </p:nvSpPr>
+        <p:spPr>
+          <a:xfrm>
+            <a:off x="4295974" y="450574"/>
+            <a:ext cx="3604256" cy="707886"/>
+          </a:xfrm>
+          <a:prstGeom prst="rect">
+            <a:avLst/>
+          </a:prstGeom>
+          <a:noFill/>
+        </p:spPr>
+        <p:txBody>
+          <a:bodyPr wrap="none" rtlCol="0">
+            <a:spAutoFit/>
+          </a:bodyPr>
+          <a:lstStyle/>
+          <a:p>
+            <a:r>
+              <a:rPr lang="en-US" sz="4000" dirty="0" smtClean="0">
+                <a:latin typeface="Arial Black" charset="0"/>
+                <a:ea typeface="Arial Black" charset="0"/>
+                <a:cs typeface="Arial Black" charset="0"/>
+              </a:rPr>
+              <a:t>Alternatives</a:t>
+            </a:r>
+            <a:endParaRPr lang="en-US" sz="4000" dirty="0">
+              <a:latin typeface="Arial Black" charset="0"/>
+              <a:ea typeface="Arial Black" charset="0"/>
+              <a:cs typeface="Arial Black" charset="0"/>
+            </a:endParaRPr>
+          </a:p>
+        </p:txBody>
+      </p:sp>
+      <p:pic>
+        <p:nvPicPr>
+          <p:cNvPr id="4" name="Picture 3"/>
+          <p:cNvPicPr>
+            <a:picLocks noChangeAspect="1"/>
+          </p:cNvPicPr>
+          <p:nvPr/>
+        </p:nvPicPr>
+        <p:blipFill>
+          <a:blip r:embed="rId2">
+            <a:extLst>
+              <a:ext uri="{28A0092B-C50C-407E-A947-70E740481C1C}">
+                <a14:useLocalDpi xmlns:a14="http://schemas.microsoft.com/office/drawing/2010/main" val="0"/>
+              </a:ext>
+            </a:extLst>
+          </a:blip>
+          <a:stretch>
+            <a:fillRect/>
+          </a:stretch>
+        </p:blipFill>
+        <p:spPr>
+          <a:xfrm>
+            <a:off x="212542" y="1158460"/>
+            <a:ext cx="11771121" cy="5560391"/>
+          </a:xfrm>
+          <a:prstGeom prst="rect">
+            <a:avLst/>
+          </a:prstGeom>
+        </p:spPr>
+      </p:pic>
+    </p:spTree>
+    <p:extLst>
+      <p:ext uri="{BB962C8B-B14F-4D97-AF65-F5344CB8AC3E}">
+        <p14:creationId xmlns:p14="http://schemas.microsoft.com/office/powerpoint/2010/main" val="1816096489"/>
+      </p:ext>
+    </p:extLst>
+  </p:cSld>
+  <p:clrMapOvr>
+    <a:masterClrMapping/>
+  </p:clrMapOvr>
+  <p:timing>
+    <p:tnLst>
+      <p:par>
+        <p:cTn id="1" dur="indefinite" restart="never" nodeType="tmRoot"/>
+      </p:par>
+    </p:tnLst>
+  </p:timing>
+</p:sld>
+</file>
+
+<file path=ppt/slides/slide17.xml><?xml version="1.0" encoding="utf-8"?>
+<p:sld xmlns:a="http://schemas.openxmlformats.org/drawingml/2006/main" xmlns:r="http://schemas.openxmlformats.org/officeDocument/2006/relationships" xmlns:p="http://schemas.openxmlformats.org/presentationml/2006/main">
+  <p:cSld>
+    <p:spTree>
+      <p:nvGrpSpPr>
+        <p:cNvPr id="1" name=""/>
+        <p:cNvGrpSpPr/>
+        <p:nvPr/>
+      </p:nvGrpSpPr>
+      <p:grpSpPr>
+        <a:xfrm>
+          <a:off x="0" y="0"/>
+          <a:ext cx="0" cy="0"/>
+          <a:chOff x="0" y="0"/>
+          <a:chExt cx="0" cy="0"/>
+        </a:xfrm>
+      </p:grpSpPr>
+      <p:sp>
+        <p:nvSpPr>
           <p:cNvPr id="2" name="Title 1"/>
           <p:cNvSpPr>
             <a:spLocks noGrp="1"/>
@@ -4259,7 +4365,7 @@
 </p:sld>
 </file>
 
-<file path=ppt/slides/slide17.xml><?xml version="1.0" encoding="utf-8"?>
+<file path=ppt/slides/slide18.xml><?xml version="1.0" encoding="utf-8"?>
 <p:sld xmlns:a="http://schemas.openxmlformats.org/drawingml/2006/main" xmlns:r="http://schemas.openxmlformats.org/officeDocument/2006/relationships" xmlns:p="http://schemas.openxmlformats.org/presentationml/2006/main">
   <p:cSld>
     <p:spTree>
@@ -4326,7 +4432,7 @@
 </p:sld>
 </file>
 
-<file path=ppt/slides/slide18.xml><?xml version="1.0" encoding="utf-8"?>
+<file path=ppt/slides/slide19.xml><?xml version="1.0" encoding="utf-8"?>
 <p:sld xmlns:a="http://schemas.openxmlformats.org/drawingml/2006/main" xmlns:r="http://schemas.openxmlformats.org/officeDocument/2006/relationships" xmlns:p="http://schemas.openxmlformats.org/presentationml/2006/main">
   <p:cSld>
     <p:spTree>
@@ -4592,7 +4698,263 @@
 </p:sld>
 </file>
 
-<file path=ppt/slides/slide19.xml><?xml version="1.0" encoding="utf-8"?>
+<file path=ppt/slides/slide2.xml><?xml version="1.0" encoding="utf-8"?>
+<p:sld xmlns:a="http://schemas.openxmlformats.org/drawingml/2006/main" xmlns:r="http://schemas.openxmlformats.org/officeDocument/2006/relationships" xmlns:p="http://schemas.openxmlformats.org/presentationml/2006/main">
+  <p:cSld>
+    <p:spTree>
+      <p:nvGrpSpPr>
+        <p:cNvPr id="1" name=""/>
+        <p:cNvGrpSpPr/>
+        <p:nvPr/>
+      </p:nvGrpSpPr>
+      <p:grpSpPr>
+        <a:xfrm>
+          <a:off x="0" y="0"/>
+          <a:ext cx="0" cy="0"/>
+          <a:chOff x="0" y="0"/>
+          <a:chExt cx="0" cy="0"/>
+        </a:xfrm>
+      </p:grpSpPr>
+      <p:sp>
+        <p:nvSpPr>
+          <p:cNvPr id="2" name="Title 1"/>
+          <p:cNvSpPr>
+            <a:spLocks noGrp="1"/>
+          </p:cNvSpPr>
+          <p:nvPr>
+            <p:ph type="title"/>
+          </p:nvPr>
+        </p:nvSpPr>
+        <p:spPr/>
+        <p:txBody>
+          <a:bodyPr>
+            <a:normAutofit/>
+          </a:bodyPr>
+          <a:lstStyle/>
+          <a:p>
+            <a:r>
+              <a:rPr lang="en-US" sz="4000" dirty="0">
+                <a:latin typeface="Arial Black" charset="0"/>
+                <a:ea typeface="Arial Black" charset="0"/>
+                <a:cs typeface="Arial Black" charset="0"/>
+              </a:rPr>
+              <a:t>Reference</a:t>
+            </a:r>
+          </a:p>
+        </p:txBody>
+      </p:sp>
+      <p:sp>
+        <p:nvSpPr>
+          <p:cNvPr id="3" name="Content Placeholder 2"/>
+          <p:cNvSpPr>
+            <a:spLocks noGrp="1"/>
+          </p:cNvSpPr>
+          <p:nvPr>
+            <p:ph idx="1"/>
+          </p:nvPr>
+        </p:nvSpPr>
+        <p:spPr>
+          <a:xfrm>
+            <a:off x="838200" y="1489959"/>
+            <a:ext cx="10515600" cy="4482578"/>
+          </a:xfrm>
+        </p:spPr>
+        <p:txBody>
+          <a:bodyPr>
+            <a:normAutofit/>
+          </a:bodyPr>
+          <a:lstStyle/>
+          <a:p>
+            <a:pPr marL="0" indent="0">
+              <a:buNone/>
+            </a:pPr>
+            <a:endParaRPr lang="en-US" sz="2000" dirty="0">
+              <a:latin typeface="Arial Black" charset="0"/>
+              <a:ea typeface="Arial Black" charset="0"/>
+              <a:cs typeface="Arial Black" charset="0"/>
+              <a:hlinkClick r:id="rId2"/>
+            </a:endParaRPr>
+          </a:p>
+          <a:p>
+            <a:r>
+              <a:rPr lang="en-US" sz="2000" b="1" dirty="0">
+                <a:latin typeface="Arial Black" panose="020B0604020202020204" pitchFamily="34" charset="0"/>
+                <a:cs typeface="Arial Black" panose="020B0604020202020204" pitchFamily="34" charset="0"/>
+                <a:hlinkClick r:id="rId3"/>
+              </a:rPr>
+              <a:t>Chapter 9</a:t>
+            </a:r>
+            <a:r>
+              <a:rPr lang="en-US" sz="2000" b="1" dirty="0" smtClean="0">
+                <a:latin typeface="Arial Black" panose="020B0604020202020204" pitchFamily="34" charset="0"/>
+                <a:cs typeface="Arial Black" panose="020B0604020202020204" pitchFamily="34" charset="0"/>
+                <a:hlinkClick r:id="rId3"/>
+              </a:rPr>
+              <a:t> </a:t>
+            </a:r>
+            <a:r>
+              <a:rPr lang="en-US" sz="2000" b="1" dirty="0">
+                <a:latin typeface="Arial Black" panose="020B0604020202020204" pitchFamily="34" charset="0"/>
+                <a:ea typeface="Arial Black" charset="0"/>
+                <a:cs typeface="Arial Black" panose="020B0604020202020204" pitchFamily="34" charset="0"/>
+                <a:hlinkClick r:id="rId4"/>
+              </a:rPr>
+              <a:t>(</a:t>
+            </a:r>
+            <a:r>
+              <a:rPr lang="en-US" sz="2000" b="1" dirty="0" smtClean="0">
+                <a:latin typeface="Arial Black" panose="020B0604020202020204" pitchFamily="34" charset="0"/>
+                <a:ea typeface="Arial Black" charset="0"/>
+                <a:cs typeface="Arial Black" panose="020B0604020202020204" pitchFamily="34" charset="0"/>
+                <a:hlinkClick r:id="rId4"/>
+              </a:rPr>
+              <a:t>O'Reilly) of Hands-On ML</a:t>
+            </a:r>
+            <a:endParaRPr lang="en-US" sz="2000" b="1" dirty="0" smtClean="0">
+              <a:latin typeface="Arial Black" panose="020B0604020202020204" pitchFamily="34" charset="0"/>
+              <a:ea typeface="Arial Black" charset="0"/>
+              <a:cs typeface="Arial Black" panose="020B0604020202020204" pitchFamily="34" charset="0"/>
+            </a:endParaRPr>
+          </a:p>
+          <a:p>
+            <a:endParaRPr lang="en-US" sz="2000" dirty="0" smtClean="0">
+              <a:latin typeface="Arial Black" charset="0"/>
+              <a:ea typeface="Arial Black" charset="0"/>
+              <a:cs typeface="Arial Black" charset="0"/>
+            </a:endParaRPr>
+          </a:p>
+          <a:p>
+            <a:r>
+              <a:rPr lang="en-US" sz="2000" dirty="0" smtClean="0">
+                <a:latin typeface="Arial Black" charset="0"/>
+                <a:ea typeface="Arial Black" charset="0"/>
+                <a:cs typeface="Arial Black" charset="0"/>
+                <a:hlinkClick r:id="rId5"/>
+              </a:rPr>
+              <a:t>Youtube on (Manual) Gradient Descent</a:t>
+            </a:r>
+            <a:endParaRPr lang="en-US" sz="2000" dirty="0" smtClean="0">
+              <a:latin typeface="Arial Black" charset="0"/>
+              <a:ea typeface="Arial Black" charset="0"/>
+              <a:cs typeface="Arial Black" charset="0"/>
+            </a:endParaRPr>
+          </a:p>
+          <a:p>
+            <a:endParaRPr lang="en-US" sz="2000" dirty="0" smtClean="0">
+              <a:latin typeface="Arial Black" charset="0"/>
+              <a:ea typeface="Arial Black" charset="0"/>
+              <a:cs typeface="Arial Black" charset="0"/>
+            </a:endParaRPr>
+          </a:p>
+          <a:p>
+            <a:r>
+              <a:rPr lang="en-US" sz="2000" dirty="0" smtClean="0">
+                <a:latin typeface="Arial Black" charset="0"/>
+                <a:ea typeface="Arial Black" charset="0"/>
+                <a:cs typeface="Arial Black" charset="0"/>
+                <a:hlinkClick r:id="rId6"/>
+              </a:rPr>
+              <a:t>Youtube on (Auto) Gradient Descent</a:t>
+            </a:r>
+            <a:endParaRPr lang="en-US" sz="2000" dirty="0" smtClean="0">
+              <a:latin typeface="Arial Black" charset="0"/>
+              <a:ea typeface="Arial Black" charset="0"/>
+              <a:cs typeface="Arial Black" charset="0"/>
+            </a:endParaRPr>
+          </a:p>
+          <a:p>
+            <a:endParaRPr lang="en-US" sz="2000" dirty="0">
+              <a:latin typeface="Arial Black" charset="0"/>
+              <a:ea typeface="Arial Black" charset="0"/>
+              <a:cs typeface="Arial Black" charset="0"/>
+            </a:endParaRPr>
+          </a:p>
+          <a:p>
+            <a:r>
+              <a:rPr lang="en-US" sz="2000" dirty="0" smtClean="0">
+                <a:latin typeface="Arial Black" charset="0"/>
+                <a:ea typeface="Arial Black" charset="0"/>
+                <a:cs typeface="Arial Black" charset="0"/>
+                <a:hlinkClick r:id="rId7"/>
+              </a:rPr>
+              <a:t>Youtube</a:t>
+            </a:r>
+            <a:endParaRPr lang="en-US" sz="2000" dirty="0" smtClean="0">
+              <a:latin typeface="Arial Black" charset="0"/>
+              <a:ea typeface="Arial Black" charset="0"/>
+              <a:cs typeface="Arial Black" charset="0"/>
+            </a:endParaRPr>
+          </a:p>
+          <a:p>
+            <a:endParaRPr lang="en-US" sz="2000" dirty="0">
+              <a:latin typeface="Arial Black" charset="0"/>
+              <a:ea typeface="Arial Black" charset="0"/>
+              <a:cs typeface="Arial Black" charset="0"/>
+            </a:endParaRPr>
+          </a:p>
+          <a:p>
+            <a:r>
+              <a:rPr lang="en-US" sz="2000" dirty="0">
+                <a:latin typeface="Arial Black" charset="0"/>
+                <a:ea typeface="Arial Black" charset="0"/>
+                <a:cs typeface="Arial Black" charset="0"/>
+                <a:hlinkClick r:id="rId8"/>
+              </a:rPr>
+              <a:t>Code</a:t>
+            </a:r>
+            <a:endParaRPr lang="en-US" sz="2000" dirty="0">
+              <a:latin typeface="Arial Black" charset="0"/>
+              <a:ea typeface="Arial Black" charset="0"/>
+              <a:cs typeface="Arial Black" charset="0"/>
+              <a:hlinkClick r:id="rId9"/>
+            </a:endParaRPr>
+          </a:p>
+        </p:txBody>
+      </p:sp>
+      <p:pic>
+        <p:nvPicPr>
+          <p:cNvPr id="6" name="Picture 5"/>
+          <p:cNvPicPr>
+            <a:picLocks noChangeAspect="1"/>
+          </p:cNvPicPr>
+          <p:nvPr/>
+        </p:nvPicPr>
+        <p:blipFill>
+          <a:blip r:embed="rId10"/>
+          <a:srcRect/>
+          <a:stretch/>
+        </p:blipFill>
+        <p:spPr>
+          <a:xfrm>
+            <a:off x="6981714" y="92806"/>
+            <a:ext cx="5051330" cy="6629270"/>
+          </a:xfrm>
+          <a:prstGeom prst="rect">
+            <a:avLst/>
+          </a:prstGeom>
+        </p:spPr>
+      </p:pic>
+    </p:spTree>
+    <p:extLst>
+      <p:ext uri="{BB962C8B-B14F-4D97-AF65-F5344CB8AC3E}">
+        <p14:creationId xmlns:p14="http://schemas.microsoft.com/office/powerpoint/2010/main" val="261458834"/>
+      </p:ext>
+    </p:extLst>
+  </p:cSld>
+  <p:clrMapOvr>
+    <a:masterClrMapping/>
+  </p:clrMapOvr>
+  <p:timing>
+    <p:tnLst>
+      <p:par>
+        <p:cTn id="1" dur="indefinite" restart="never" nodeType="tmRoot"/>
+      </p:par>
+    </p:tnLst>
+  </p:timing>
+</p:sld>
+</file>
+
+<file path=ppt/slides/slide20.xml><?xml version="1.0" encoding="utf-8"?>
 <p:sld xmlns:a="http://schemas.openxmlformats.org/drawingml/2006/main" xmlns:r="http://schemas.openxmlformats.org/officeDocument/2006/relationships" xmlns:p="http://schemas.openxmlformats.org/presentationml/2006/main">
   <p:cSld>
     <p:spTree>
@@ -4659,263 +5021,7 @@
 </p:sld>
 </file>
 
-<file path=ppt/slides/slide2.xml><?xml version="1.0" encoding="utf-8"?>
-<p:sld xmlns:a="http://schemas.openxmlformats.org/drawingml/2006/main" xmlns:r="http://schemas.openxmlformats.org/officeDocument/2006/relationships" xmlns:p="http://schemas.openxmlformats.org/presentationml/2006/main">
-  <p:cSld>
-    <p:spTree>
-      <p:nvGrpSpPr>
-        <p:cNvPr id="1" name=""/>
-        <p:cNvGrpSpPr/>
-        <p:nvPr/>
-      </p:nvGrpSpPr>
-      <p:grpSpPr>
-        <a:xfrm>
-          <a:off x="0" y="0"/>
-          <a:ext cx="0" cy="0"/>
-          <a:chOff x="0" y="0"/>
-          <a:chExt cx="0" cy="0"/>
-        </a:xfrm>
-      </p:grpSpPr>
-      <p:sp>
-        <p:nvSpPr>
-          <p:cNvPr id="2" name="Title 1"/>
-          <p:cNvSpPr>
-            <a:spLocks noGrp="1"/>
-          </p:cNvSpPr>
-          <p:nvPr>
-            <p:ph type="title"/>
-          </p:nvPr>
-        </p:nvSpPr>
-        <p:spPr/>
-        <p:txBody>
-          <a:bodyPr>
-            <a:normAutofit/>
-          </a:bodyPr>
-          <a:lstStyle/>
-          <a:p>
-            <a:r>
-              <a:rPr lang="en-US" sz="4000" dirty="0">
-                <a:latin typeface="Arial Black" charset="0"/>
-                <a:ea typeface="Arial Black" charset="0"/>
-                <a:cs typeface="Arial Black" charset="0"/>
-              </a:rPr>
-              <a:t>Reference</a:t>
-            </a:r>
-          </a:p>
-        </p:txBody>
-      </p:sp>
-      <p:sp>
-        <p:nvSpPr>
-          <p:cNvPr id="3" name="Content Placeholder 2"/>
-          <p:cNvSpPr>
-            <a:spLocks noGrp="1"/>
-          </p:cNvSpPr>
-          <p:nvPr>
-            <p:ph idx="1"/>
-          </p:nvPr>
-        </p:nvSpPr>
-        <p:spPr>
-          <a:xfrm>
-            <a:off x="838200" y="1489959"/>
-            <a:ext cx="10515600" cy="4482578"/>
-          </a:xfrm>
-        </p:spPr>
-        <p:txBody>
-          <a:bodyPr>
-            <a:normAutofit/>
-          </a:bodyPr>
-          <a:lstStyle/>
-          <a:p>
-            <a:pPr marL="0" indent="0">
-              <a:buNone/>
-            </a:pPr>
-            <a:endParaRPr lang="en-US" sz="2000" dirty="0">
-              <a:latin typeface="Arial Black" charset="0"/>
-              <a:ea typeface="Arial Black" charset="0"/>
-              <a:cs typeface="Arial Black" charset="0"/>
-              <a:hlinkClick r:id="rId2"/>
-            </a:endParaRPr>
-          </a:p>
-          <a:p>
-            <a:r>
-              <a:rPr lang="en-US" sz="2000" b="1" dirty="0">
-                <a:latin typeface="Arial Black" panose="020B0604020202020204" pitchFamily="34" charset="0"/>
-                <a:cs typeface="Arial Black" panose="020B0604020202020204" pitchFamily="34" charset="0"/>
-                <a:hlinkClick r:id="rId3"/>
-              </a:rPr>
-              <a:t>Chapter 9</a:t>
-            </a:r>
-            <a:r>
-              <a:rPr lang="en-US" sz="2000" b="1" dirty="0" smtClean="0">
-                <a:latin typeface="Arial Black" panose="020B0604020202020204" pitchFamily="34" charset="0"/>
-                <a:cs typeface="Arial Black" panose="020B0604020202020204" pitchFamily="34" charset="0"/>
-                <a:hlinkClick r:id="rId3"/>
-              </a:rPr>
-              <a:t> </a:t>
-            </a:r>
-            <a:r>
-              <a:rPr lang="en-US" sz="2000" b="1" dirty="0">
-                <a:latin typeface="Arial Black" panose="020B0604020202020204" pitchFamily="34" charset="0"/>
-                <a:ea typeface="Arial Black" charset="0"/>
-                <a:cs typeface="Arial Black" panose="020B0604020202020204" pitchFamily="34" charset="0"/>
-                <a:hlinkClick r:id="rId4"/>
-              </a:rPr>
-              <a:t>(</a:t>
-            </a:r>
-            <a:r>
-              <a:rPr lang="en-US" sz="2000" b="1" dirty="0" smtClean="0">
-                <a:latin typeface="Arial Black" panose="020B0604020202020204" pitchFamily="34" charset="0"/>
-                <a:ea typeface="Arial Black" charset="0"/>
-                <a:cs typeface="Arial Black" panose="020B0604020202020204" pitchFamily="34" charset="0"/>
-                <a:hlinkClick r:id="rId4"/>
-              </a:rPr>
-              <a:t>O'Reilly) of Hands-On ML</a:t>
-            </a:r>
-            <a:endParaRPr lang="en-US" sz="2000" b="1" dirty="0" smtClean="0">
-              <a:latin typeface="Arial Black" panose="020B0604020202020204" pitchFamily="34" charset="0"/>
-              <a:ea typeface="Arial Black" charset="0"/>
-              <a:cs typeface="Arial Black" panose="020B0604020202020204" pitchFamily="34" charset="0"/>
-            </a:endParaRPr>
-          </a:p>
-          <a:p>
-            <a:endParaRPr lang="en-US" sz="2000" dirty="0" smtClean="0">
-              <a:latin typeface="Arial Black" charset="0"/>
-              <a:ea typeface="Arial Black" charset="0"/>
-              <a:cs typeface="Arial Black" charset="0"/>
-            </a:endParaRPr>
-          </a:p>
-          <a:p>
-            <a:r>
-              <a:rPr lang="en-US" sz="2000" dirty="0" smtClean="0">
-                <a:latin typeface="Arial Black" charset="0"/>
-                <a:ea typeface="Arial Black" charset="0"/>
-                <a:cs typeface="Arial Black" charset="0"/>
-                <a:hlinkClick r:id="rId5"/>
-              </a:rPr>
-              <a:t>Youtube on (Manual) Gradient Descent</a:t>
-            </a:r>
-            <a:endParaRPr lang="en-US" sz="2000" dirty="0" smtClean="0">
-              <a:latin typeface="Arial Black" charset="0"/>
-              <a:ea typeface="Arial Black" charset="0"/>
-              <a:cs typeface="Arial Black" charset="0"/>
-            </a:endParaRPr>
-          </a:p>
-          <a:p>
-            <a:endParaRPr lang="en-US" sz="2000" dirty="0" smtClean="0">
-              <a:latin typeface="Arial Black" charset="0"/>
-              <a:ea typeface="Arial Black" charset="0"/>
-              <a:cs typeface="Arial Black" charset="0"/>
-            </a:endParaRPr>
-          </a:p>
-          <a:p>
-            <a:r>
-              <a:rPr lang="en-US" sz="2000" dirty="0" smtClean="0">
-                <a:latin typeface="Arial Black" charset="0"/>
-                <a:ea typeface="Arial Black" charset="0"/>
-                <a:cs typeface="Arial Black" charset="0"/>
-                <a:hlinkClick r:id="rId6"/>
-              </a:rPr>
-              <a:t>Youtube on (Auto) Gradient Descent</a:t>
-            </a:r>
-            <a:endParaRPr lang="en-US" sz="2000" dirty="0" smtClean="0">
-              <a:latin typeface="Arial Black" charset="0"/>
-              <a:ea typeface="Arial Black" charset="0"/>
-              <a:cs typeface="Arial Black" charset="0"/>
-            </a:endParaRPr>
-          </a:p>
-          <a:p>
-            <a:endParaRPr lang="en-US" sz="2000" dirty="0">
-              <a:latin typeface="Arial Black" charset="0"/>
-              <a:ea typeface="Arial Black" charset="0"/>
-              <a:cs typeface="Arial Black" charset="0"/>
-            </a:endParaRPr>
-          </a:p>
-          <a:p>
-            <a:r>
-              <a:rPr lang="en-US" sz="2000" dirty="0" smtClean="0">
-                <a:latin typeface="Arial Black" charset="0"/>
-                <a:ea typeface="Arial Black" charset="0"/>
-                <a:cs typeface="Arial Black" charset="0"/>
-                <a:hlinkClick r:id="rId7"/>
-              </a:rPr>
-              <a:t>Youtube</a:t>
-            </a:r>
-            <a:endParaRPr lang="en-US" sz="2000" dirty="0" smtClean="0">
-              <a:latin typeface="Arial Black" charset="0"/>
-              <a:ea typeface="Arial Black" charset="0"/>
-              <a:cs typeface="Arial Black" charset="0"/>
-            </a:endParaRPr>
-          </a:p>
-          <a:p>
-            <a:endParaRPr lang="en-US" sz="2000" dirty="0">
-              <a:latin typeface="Arial Black" charset="0"/>
-              <a:ea typeface="Arial Black" charset="0"/>
-              <a:cs typeface="Arial Black" charset="0"/>
-            </a:endParaRPr>
-          </a:p>
-          <a:p>
-            <a:r>
-              <a:rPr lang="en-US" sz="2000" dirty="0">
-                <a:latin typeface="Arial Black" charset="0"/>
-                <a:ea typeface="Arial Black" charset="0"/>
-                <a:cs typeface="Arial Black" charset="0"/>
-                <a:hlinkClick r:id="rId8"/>
-              </a:rPr>
-              <a:t>Code</a:t>
-            </a:r>
-            <a:endParaRPr lang="en-US" sz="2000" dirty="0">
-              <a:latin typeface="Arial Black" charset="0"/>
-              <a:ea typeface="Arial Black" charset="0"/>
-              <a:cs typeface="Arial Black" charset="0"/>
-              <a:hlinkClick r:id="rId9"/>
-            </a:endParaRPr>
-          </a:p>
-        </p:txBody>
-      </p:sp>
-      <p:pic>
-        <p:nvPicPr>
-          <p:cNvPr id="6" name="Picture 5"/>
-          <p:cNvPicPr>
-            <a:picLocks noChangeAspect="1"/>
-          </p:cNvPicPr>
-          <p:nvPr/>
-        </p:nvPicPr>
-        <p:blipFill>
-          <a:blip r:embed="rId10"/>
-          <a:srcRect/>
-          <a:stretch/>
-        </p:blipFill>
-        <p:spPr>
-          <a:xfrm>
-            <a:off x="6981714" y="92806"/>
-            <a:ext cx="5051330" cy="6629270"/>
-          </a:xfrm>
-          <a:prstGeom prst="rect">
-            <a:avLst/>
-          </a:prstGeom>
-        </p:spPr>
-      </p:pic>
-    </p:spTree>
-    <p:extLst>
-      <p:ext uri="{BB962C8B-B14F-4D97-AF65-F5344CB8AC3E}">
-        <p14:creationId xmlns:p14="http://schemas.microsoft.com/office/powerpoint/2010/main" val="261458834"/>
-      </p:ext>
-    </p:extLst>
-  </p:cSld>
-  <p:clrMapOvr>
-    <a:masterClrMapping/>
-  </p:clrMapOvr>
-  <p:timing>
-    <p:tnLst>
-      <p:par>
-        <p:cTn id="1" dur="indefinite" restart="never" nodeType="tmRoot"/>
-      </p:par>
-    </p:tnLst>
-  </p:timing>
-</p:sld>
-</file>
-
-<file path=ppt/slides/slide20.xml><?xml version="1.0" encoding="utf-8"?>
+<file path=ppt/slides/slide21.xml><?xml version="1.0" encoding="utf-8"?>
 <p:sld xmlns:a="http://schemas.openxmlformats.org/drawingml/2006/main" xmlns:r="http://schemas.openxmlformats.org/officeDocument/2006/relationships" xmlns:p="http://schemas.openxmlformats.org/presentationml/2006/main">
   <p:cSld>
     <p:spTree>
@@ -4982,7 +5088,7 @@
 </p:sld>
 </file>
 
-<file path=ppt/slides/slide21.xml><?xml version="1.0" encoding="utf-8"?>
+<file path=ppt/slides/slide22.xml><?xml version="1.0" encoding="utf-8"?>
 <p:sld xmlns:a="http://schemas.openxmlformats.org/drawingml/2006/main" xmlns:r="http://schemas.openxmlformats.org/officeDocument/2006/relationships" xmlns:p="http://schemas.openxmlformats.org/presentationml/2006/main">
   <p:cSld>
     <p:spTree>

</xml_diff>